<commit_message>
04-02.pptx - 7페이지 수정
</commit_message>
<xml_diff>
--- a/ppt/04-02.pptx
+++ b/ppt/04-02.pptx
@@ -3429,7 +3429,6 @@
               <a:rPr lang="en-US" altLang="ko-KR" dirty="0"/>
               <a:t>UI-SJN-23-002L</a:t>
             </a:r>
-            <a:endParaRPr lang="en-US" altLang="ko-KR" dirty="0"/>
           </a:p>
         </p:txBody>
       </p:sp>
@@ -3849,7 +3848,6 @@
               <a:rPr lang="en-US" altLang="ko-KR" dirty="0"/>
               <a:t>UI-SJN-20-001U</a:t>
             </a:r>
-            <a:endParaRPr lang="en-US" altLang="ko-KR" dirty="0"/>
           </a:p>
         </p:txBody>
       </p:sp>
@@ -4090,7 +4088,6 @@
               <a:rPr lang="en-US" altLang="ko-KR" dirty="0"/>
               <a:t>UI-SJN-42-003L</a:t>
             </a:r>
-            <a:endParaRPr lang="en-US" altLang="ko-KR" dirty="0"/>
           </a:p>
         </p:txBody>
       </p:sp>
@@ -5199,7 +5196,6 @@
               <a:rPr lang="en-US" altLang="ko-KR" dirty="0"/>
               <a:t>UI-SJN-32-010L</a:t>
             </a:r>
-            <a:endParaRPr lang="en-US" altLang="ko-KR" dirty="0"/>
           </a:p>
         </p:txBody>
       </p:sp>
@@ -5369,6 +5365,93 @@
           </a:p>
         </p:txBody>
       </p:sp>
+      <p:pic>
+        <p:nvPicPr>
+          <p:cNvPr id="2" name="그림 1"/>
+          <p:cNvPicPr>
+            <a:picLocks noChangeAspect="1"/>
+          </p:cNvPicPr>
+          <p:nvPr/>
+        </p:nvPicPr>
+        <p:blipFill>
+          <a:blip r:embed="rId4"/>
+          <a:stretch>
+            <a:fillRect/>
+          </a:stretch>
+        </p:blipFill>
+        <p:spPr>
+          <a:xfrm>
+            <a:off x="955636" y="5141626"/>
+            <a:ext cx="3096057" cy="638264"/>
+          </a:xfrm>
+          <a:prstGeom prst="rect">
+            <a:avLst/>
+          </a:prstGeom>
+        </p:spPr>
+      </p:pic>
+      <p:sp>
+        <p:nvSpPr>
+          <p:cNvPr id="10" name="TextBox 9"/>
+          <p:cNvSpPr txBox="1"/>
+          <p:nvPr/>
+        </p:nvSpPr>
+        <p:spPr>
+          <a:xfrm>
+            <a:off x="5182205" y="5265055"/>
+            <a:ext cx="1324402" cy="307777"/>
+          </a:xfrm>
+          <a:prstGeom prst="rect">
+            <a:avLst/>
+          </a:prstGeom>
+          <a:noFill/>
+        </p:spPr>
+        <p:txBody>
+          <a:bodyPr wrap="none" rtlCol="0">
+            <a:spAutoFit/>
+          </a:bodyPr>
+          <a:lstStyle/>
+          <a:p>
+            <a:r>
+              <a:rPr lang="ko-KR" altLang="en-US" sz="1400" dirty="0" smtClean="0"/>
+              <a:t>비활성화 추가</a:t>
+            </a:r>
+            <a:endParaRPr lang="ko-KR" altLang="en-US" sz="1400" dirty="0"/>
+          </a:p>
+        </p:txBody>
+      </p:sp>
+      <p:cxnSp>
+        <p:nvCxnSpPr>
+          <p:cNvPr id="6" name="직선 화살표 연결선 5"/>
+          <p:cNvCxnSpPr/>
+          <p:nvPr/>
+        </p:nvCxnSpPr>
+        <p:spPr>
+          <a:xfrm flipH="1">
+            <a:off x="4219731" y="5442611"/>
+            <a:ext cx="779488" cy="0"/>
+          </a:xfrm>
+          <a:prstGeom prst="straightConnector1">
+            <a:avLst/>
+          </a:prstGeom>
+          <a:ln>
+            <a:tailEnd type="triangle"/>
+          </a:ln>
+        </p:spPr>
+        <p:style>
+          <a:lnRef idx="1">
+            <a:schemeClr val="accent1"/>
+          </a:lnRef>
+          <a:fillRef idx="0">
+            <a:schemeClr val="accent1"/>
+          </a:fillRef>
+          <a:effectRef idx="0">
+            <a:schemeClr val="accent1"/>
+          </a:effectRef>
+          <a:fontRef idx="minor">
+            <a:schemeClr val="tx1"/>
+          </a:fontRef>
+        </p:style>
+      </p:cxnSp>
     </p:spTree>
     <p:extLst>
       <p:ext uri="{BB962C8B-B14F-4D97-AF65-F5344CB8AC3E}">

</xml_diff>